<commit_message>
minor edtits stable pptx's, midterm-ta-probs
</commit_message>
<xml_diff>
--- a/spring13/slides13/stable-matching.pptx
+++ b/spring13/slides13/stable-matching.pptx
@@ -3703,14 +3703,7 @@
                 <a:latin typeface="Comic Sans MS" pitchFamily="66" charset="0"/>
                 <a:ea typeface="宋体" pitchFamily="2" charset="-122"/>
               </a:rPr>
-              <a:t>Albert R Meyer.     </a:t>
-            </a:r>
-            <a:r>
-              <a:rPr lang="en-US" altLang="zh-CN" sz="1000" dirty="0" smtClean="0">
-                <a:latin typeface="Comic Sans MS" pitchFamily="66" charset="0"/>
-                <a:ea typeface="宋体" pitchFamily="2" charset="-122"/>
-              </a:rPr>
-              <a:t>April</a:t>
+              <a:t>Albert R Meyer.     April</a:t>
             </a:r>
             <a:r>
               <a:rPr lang="en-US" altLang="zh-CN" sz="1000" baseline="0" dirty="0" smtClean="0">
@@ -3724,14 +3717,7 @@
                 <a:latin typeface="Comic Sans MS" pitchFamily="66" charset="0"/>
                 <a:ea typeface="宋体" pitchFamily="2" charset="-122"/>
               </a:rPr>
-              <a:t>, </a:t>
-            </a:r>
-            <a:r>
-              <a:rPr lang="en-US" altLang="zh-CN" sz="1000" dirty="0" smtClean="0">
-                <a:latin typeface="Comic Sans MS" pitchFamily="66" charset="0"/>
-                <a:ea typeface="宋体" pitchFamily="2" charset="-122"/>
-              </a:rPr>
-              <a:t>2013</a:t>
+              <a:t>, 2013</a:t>
             </a:r>
             <a:endParaRPr lang="en-US" altLang="zh-CN" sz="1000" dirty="0">
               <a:latin typeface="Comic Sans MS" pitchFamily="66" charset="0"/>
@@ -4365,107 +4351,20 @@
   <p:clrMapOvr>
     <a:masterClrMapping/>
   </p:clrMapOvr>
-  <mc:AlternateContent xmlns:mc="http://schemas.openxmlformats.org/markup-compatibility/2006">
-    <mc:Choice xmlns:p14="http://schemas.microsoft.com/office/powerpoint/2010/main" Requires="p14">
+  <mc:AlternateContent xmlns:mc="http://schemas.openxmlformats.org/markup-compatibility/2006" xmlns:p14="http://schemas.microsoft.com/office/powerpoint/2010/main">
+    <mc:Choice Requires="p14">
       <p:transition p14:dur="0" advClick="0"/>
     </mc:Choice>
-    <mc:Fallback>
+    <mc:Fallback xmlns="">
       <p:transition xmlns:p14="http://schemas.microsoft.com/office/powerpoint/2010/main" advClick="0"/>
     </mc:Fallback>
   </mc:AlternateContent>
   <p:timing>
     <p:tnLst>
       <p:par>
-        <p:cTn xmlns:p14="http://schemas.microsoft.com/office/powerpoint/2010/main" id="1" dur="indefinite" restart="never" nodeType="tmRoot">
-          <p:childTnLst>
-            <p:seq concurrent="1" nextAc="seek">
-              <p:cTn id="2" dur="indefinite" nodeType="mainSeq">
-                <p:childTnLst>
-                  <p:par>
-                    <p:cTn id="3" fill="hold">
-                      <p:stCondLst>
-                        <p:cond delay="indefinite"/>
-                      </p:stCondLst>
-                      <p:childTnLst>
-                        <p:par>
-                          <p:cTn id="4" fill="hold">
-                            <p:stCondLst>
-                              <p:cond delay="0"/>
-                            </p:stCondLst>
-                            <p:childTnLst>
-                              <p:par>
-                                <p:cTn id="5" presetID="9" presetClass="entr" presetSubtype="0" fill="hold" grpId="0" nodeType="clickEffect">
-                                  <p:stCondLst>
-                                    <p:cond delay="0"/>
-                                  </p:stCondLst>
-                                  <p:childTnLst>
-                                    <p:set>
-                                      <p:cBhvr>
-                                        <p:cTn id="6" dur="1" fill="hold">
-                                          <p:stCondLst>
-                                            <p:cond delay="0"/>
-                                          </p:stCondLst>
-                                        </p:cTn>
-                                        <p:tgtEl>
-                                          <p:spTgt spid="10244">
-                                            <p:txEl>
-                                              <p:pRg st="0" end="0"/>
-                                            </p:txEl>
-                                          </p:spTgt>
-                                        </p:tgtEl>
-                                        <p:attrNameLst>
-                                          <p:attrName>style.visibility</p:attrName>
-                                        </p:attrNameLst>
-                                      </p:cBhvr>
-                                      <p:to>
-                                        <p:strVal val="visible"/>
-                                      </p:to>
-                                    </p:set>
-                                    <p:animEffect transition="in" filter="dissolve">
-                                      <p:cBhvr>
-                                        <p:cTn id="7" dur="1000"/>
-                                        <p:tgtEl>
-                                          <p:spTgt spid="10244">
-                                            <p:txEl>
-                                              <p:pRg st="0" end="0"/>
-                                            </p:txEl>
-                                          </p:spTgt>
-                                        </p:tgtEl>
-                                      </p:cBhvr>
-                                    </p:animEffect>
-                                  </p:childTnLst>
-                                </p:cTn>
-                              </p:par>
-                            </p:childTnLst>
-                          </p:cTn>
-                        </p:par>
-                      </p:childTnLst>
-                    </p:cTn>
-                  </p:par>
-                </p:childTnLst>
-              </p:cTn>
-              <p:prevCondLst>
-                <p:cond evt="onPrev" delay="0">
-                  <p:tgtEl>
-                    <p:sldTgt/>
-                  </p:tgtEl>
-                </p:cond>
-              </p:prevCondLst>
-              <p:nextCondLst>
-                <p:cond evt="onNext" delay="0">
-                  <p:tgtEl>
-                    <p:sldTgt/>
-                  </p:tgtEl>
-                </p:cond>
-              </p:nextCondLst>
-            </p:seq>
-          </p:childTnLst>
-        </p:cTn>
+        <p:cTn xmlns:p14="http://schemas.microsoft.com/office/powerpoint/2010/main" id="1" dur="indefinite" restart="never" nodeType="tmRoot"/>
       </p:par>
     </p:tnLst>
-    <p:bldLst>
-      <p:bldP spid="10244" grpId="0" uiExpand="1" build="p"/>
-    </p:bldLst>
   </p:timing>
 </p:sld>
 </file>
@@ -7812,13 +7711,13 @@
   <p:clrMapOvr>
     <a:masterClrMapping/>
   </p:clrMapOvr>
-  <mc:AlternateContent xmlns:mc="http://schemas.openxmlformats.org/markup-compatibility/2006">
-    <mc:Choice xmlns:p14="http://schemas.microsoft.com/office/powerpoint/2010/main" Requires="p14">
+  <mc:AlternateContent xmlns:mc="http://schemas.openxmlformats.org/markup-compatibility/2006" xmlns:p14="http://schemas.microsoft.com/office/powerpoint/2010/main">
+    <mc:Choice Requires="p14">
       <p:transition spd="slow" p14:dur="800" advClick="0">
         <p:fade thruBlk="1"/>
       </p:transition>
     </mc:Choice>
-    <mc:Fallback>
+    <mc:Fallback xmlns="">
       <p:transition xmlns:p14="http://schemas.microsoft.com/office/powerpoint/2010/main" spd="slow" advClick="0">
         <p:fade thruBlk="1"/>
       </p:transition>

</xml_diff>